<commit_message>
Small updates to Unit Test chapter
Small updates to Unit Test chapter
</commit_message>
<xml_diff>
--- a/Chap/UnitTest/Presentations/Unit Tests.pptx
+++ b/Chap/UnitTest/Presentations/Unit Tests.pptx
@@ -19,14 +19,14 @@
     <p:sldId id="372" r:id="rId13"/>
     <p:sldId id="373" r:id="rId14"/>
     <p:sldId id="374" r:id="rId15"/>
-    <p:sldId id="375" r:id="rId16"/>
-    <p:sldId id="376" r:id="rId17"/>
-    <p:sldId id="377" r:id="rId18"/>
-    <p:sldId id="378" r:id="rId19"/>
-    <p:sldId id="379" r:id="rId20"/>
-    <p:sldId id="380" r:id="rId21"/>
-    <p:sldId id="381" r:id="rId22"/>
-    <p:sldId id="382" r:id="rId23"/>
+    <p:sldId id="376" r:id="rId16"/>
+    <p:sldId id="377" r:id="rId17"/>
+    <p:sldId id="378" r:id="rId18"/>
+    <p:sldId id="379" r:id="rId19"/>
+    <p:sldId id="380" r:id="rId20"/>
+    <p:sldId id="381" r:id="rId21"/>
+    <p:sldId id="382" r:id="rId22"/>
+    <p:sldId id="388" r:id="rId23"/>
     <p:sldId id="383" r:id="rId24"/>
     <p:sldId id="384" r:id="rId25"/>
     <p:sldId id="385" r:id="rId26"/>
@@ -180,10 +180,9 @@
           </a:lstStyle>
           <a:p>
             <a:r>
-              <a:rPr lang="da-DK" smtClean="0"/>
+              <a:rPr lang="da-DK"/>
               <a:t>Klik for at redigere i master</a:t>
             </a:r>
-            <a:endParaRPr lang="da-DK"/>
           </a:p>
         </p:txBody>
       </p:sp>
@@ -245,10 +244,9 @@
           </a:lstStyle>
           <a:p>
             <a:r>
-              <a:rPr lang="da-DK" smtClean="0"/>
+              <a:rPr lang="da-DK"/>
               <a:t>Klik for at redigere undertiteltypografien i masteren</a:t>
             </a:r>
-            <a:endParaRPr lang="da-DK"/>
           </a:p>
         </p:txBody>
       </p:sp>
@@ -269,7 +267,7 @@
           <a:p>
             <a:fld id="{E15B7D8E-2A20-4C0E-991C-872DBB7459A8}" type="datetimeFigureOut">
               <a:rPr lang="da-DK" smtClean="0"/>
-              <a:t>17-02-2018</a:t>
+              <a:t>12-03-2023</a:t>
             </a:fld>
             <a:endParaRPr lang="da-DK"/>
           </a:p>
@@ -363,10 +361,9 @@
           <a:lstStyle/>
           <a:p>
             <a:r>
-              <a:rPr lang="da-DK" smtClean="0"/>
+              <a:rPr lang="da-DK"/>
               <a:t>Klik for at redigere i master</a:t>
             </a:r>
-            <a:endParaRPr lang="da-DK"/>
           </a:p>
         </p:txBody>
       </p:sp>
@@ -387,38 +384,37 @@
           <a:p>
             <a:pPr lvl="0"/>
             <a:r>
-              <a:rPr lang="da-DK" smtClean="0"/>
+              <a:rPr lang="da-DK"/>
               <a:t>Rediger typografien i masterens</a:t>
             </a:r>
           </a:p>
           <a:p>
             <a:pPr lvl="1"/>
             <a:r>
-              <a:rPr lang="da-DK" smtClean="0"/>
+              <a:rPr lang="da-DK"/>
               <a:t>Andet niveau</a:t>
             </a:r>
           </a:p>
           <a:p>
             <a:pPr lvl="2"/>
             <a:r>
-              <a:rPr lang="da-DK" smtClean="0"/>
+              <a:rPr lang="da-DK"/>
               <a:t>Tredje niveau</a:t>
             </a:r>
           </a:p>
           <a:p>
             <a:pPr lvl="3"/>
             <a:r>
-              <a:rPr lang="da-DK" smtClean="0"/>
+              <a:rPr lang="da-DK"/>
               <a:t>Fjerde niveau</a:t>
             </a:r>
           </a:p>
           <a:p>
             <a:pPr lvl="4"/>
             <a:r>
-              <a:rPr lang="da-DK" smtClean="0"/>
+              <a:rPr lang="da-DK"/>
               <a:t>Femte niveau</a:t>
             </a:r>
-            <a:endParaRPr lang="da-DK"/>
           </a:p>
         </p:txBody>
       </p:sp>
@@ -439,7 +435,7 @@
           <a:p>
             <a:fld id="{E15B7D8E-2A20-4C0E-991C-872DBB7459A8}" type="datetimeFigureOut">
               <a:rPr lang="da-DK" smtClean="0"/>
-              <a:t>17-02-2018</a:t>
+              <a:t>12-03-2023</a:t>
             </a:fld>
             <a:endParaRPr lang="da-DK"/>
           </a:p>
@@ -538,10 +534,9 @@
           <a:lstStyle/>
           <a:p>
             <a:r>
-              <a:rPr lang="da-DK" smtClean="0"/>
+              <a:rPr lang="da-DK"/>
               <a:t>Klik for at redigere i master</a:t>
             </a:r>
-            <a:endParaRPr lang="da-DK"/>
           </a:p>
         </p:txBody>
       </p:sp>
@@ -567,38 +562,37 @@
           <a:p>
             <a:pPr lvl="0"/>
             <a:r>
-              <a:rPr lang="da-DK" smtClean="0"/>
+              <a:rPr lang="da-DK"/>
               <a:t>Rediger typografien i masterens</a:t>
             </a:r>
           </a:p>
           <a:p>
             <a:pPr lvl="1"/>
             <a:r>
-              <a:rPr lang="da-DK" smtClean="0"/>
+              <a:rPr lang="da-DK"/>
               <a:t>Andet niveau</a:t>
             </a:r>
           </a:p>
           <a:p>
             <a:pPr lvl="2"/>
             <a:r>
-              <a:rPr lang="da-DK" smtClean="0"/>
+              <a:rPr lang="da-DK"/>
               <a:t>Tredje niveau</a:t>
             </a:r>
           </a:p>
           <a:p>
             <a:pPr lvl="3"/>
             <a:r>
-              <a:rPr lang="da-DK" smtClean="0"/>
+              <a:rPr lang="da-DK"/>
               <a:t>Fjerde niveau</a:t>
             </a:r>
           </a:p>
           <a:p>
             <a:pPr lvl="4"/>
             <a:r>
-              <a:rPr lang="da-DK" smtClean="0"/>
+              <a:rPr lang="da-DK"/>
               <a:t>Femte niveau</a:t>
             </a:r>
-            <a:endParaRPr lang="da-DK"/>
           </a:p>
         </p:txBody>
       </p:sp>
@@ -619,7 +613,7 @@
           <a:p>
             <a:fld id="{E15B7D8E-2A20-4C0E-991C-872DBB7459A8}" type="datetimeFigureOut">
               <a:rPr lang="da-DK" smtClean="0"/>
-              <a:t>17-02-2018</a:t>
+              <a:t>12-03-2023</a:t>
             </a:fld>
             <a:endParaRPr lang="da-DK"/>
           </a:p>
@@ -713,10 +707,9 @@
           <a:lstStyle/>
           <a:p>
             <a:r>
-              <a:rPr lang="da-DK" smtClean="0"/>
+              <a:rPr lang="da-DK"/>
               <a:t>Klik for at redigere i master</a:t>
             </a:r>
-            <a:endParaRPr lang="da-DK"/>
           </a:p>
         </p:txBody>
       </p:sp>
@@ -737,38 +730,37 @@
           <a:p>
             <a:pPr lvl="0"/>
             <a:r>
-              <a:rPr lang="da-DK" smtClean="0"/>
+              <a:rPr lang="da-DK"/>
               <a:t>Rediger typografien i masterens</a:t>
             </a:r>
           </a:p>
           <a:p>
             <a:pPr lvl="1"/>
             <a:r>
-              <a:rPr lang="da-DK" smtClean="0"/>
+              <a:rPr lang="da-DK"/>
               <a:t>Andet niveau</a:t>
             </a:r>
           </a:p>
           <a:p>
             <a:pPr lvl="2"/>
             <a:r>
-              <a:rPr lang="da-DK" smtClean="0"/>
+              <a:rPr lang="da-DK"/>
               <a:t>Tredje niveau</a:t>
             </a:r>
           </a:p>
           <a:p>
             <a:pPr lvl="3"/>
             <a:r>
-              <a:rPr lang="da-DK" smtClean="0"/>
+              <a:rPr lang="da-DK"/>
               <a:t>Fjerde niveau</a:t>
             </a:r>
           </a:p>
           <a:p>
             <a:pPr lvl="4"/>
             <a:r>
-              <a:rPr lang="da-DK" smtClean="0"/>
+              <a:rPr lang="da-DK"/>
               <a:t>Femte niveau</a:t>
             </a:r>
-            <a:endParaRPr lang="da-DK"/>
           </a:p>
         </p:txBody>
       </p:sp>
@@ -789,7 +781,7 @@
           <a:p>
             <a:fld id="{E15B7D8E-2A20-4C0E-991C-872DBB7459A8}" type="datetimeFigureOut">
               <a:rPr lang="da-DK" smtClean="0"/>
-              <a:t>17-02-2018</a:t>
+              <a:t>12-03-2023</a:t>
             </a:fld>
             <a:endParaRPr lang="da-DK"/>
           </a:p>
@@ -892,10 +884,9 @@
           </a:lstStyle>
           <a:p>
             <a:r>
-              <a:rPr lang="da-DK" smtClean="0"/>
+              <a:rPr lang="da-DK"/>
               <a:t>Klik for at redigere i master</a:t>
             </a:r>
-            <a:endParaRPr lang="da-DK"/>
           </a:p>
         </p:txBody>
       </p:sp>
@@ -1012,7 +1003,7 @@
           <a:p>
             <a:pPr lvl="0"/>
             <a:r>
-              <a:rPr lang="da-DK" smtClean="0"/>
+              <a:rPr lang="da-DK"/>
               <a:t>Rediger typografien i masterens</a:t>
             </a:r>
           </a:p>
@@ -1035,7 +1026,7 @@
           <a:p>
             <a:fld id="{E15B7D8E-2A20-4C0E-991C-872DBB7459A8}" type="datetimeFigureOut">
               <a:rPr lang="da-DK" smtClean="0"/>
-              <a:t>17-02-2018</a:t>
+              <a:t>12-03-2023</a:t>
             </a:fld>
             <a:endParaRPr lang="da-DK"/>
           </a:p>
@@ -1129,10 +1120,9 @@
           <a:lstStyle/>
           <a:p>
             <a:r>
-              <a:rPr lang="da-DK" smtClean="0"/>
+              <a:rPr lang="da-DK"/>
               <a:t>Klik for at redigere i master</a:t>
             </a:r>
-            <a:endParaRPr lang="da-DK"/>
           </a:p>
         </p:txBody>
       </p:sp>
@@ -1158,38 +1148,37 @@
           <a:p>
             <a:pPr lvl="0"/>
             <a:r>
-              <a:rPr lang="da-DK" smtClean="0"/>
+              <a:rPr lang="da-DK"/>
               <a:t>Rediger typografien i masterens</a:t>
             </a:r>
           </a:p>
           <a:p>
             <a:pPr lvl="1"/>
             <a:r>
-              <a:rPr lang="da-DK" smtClean="0"/>
+              <a:rPr lang="da-DK"/>
               <a:t>Andet niveau</a:t>
             </a:r>
           </a:p>
           <a:p>
             <a:pPr lvl="2"/>
             <a:r>
-              <a:rPr lang="da-DK" smtClean="0"/>
+              <a:rPr lang="da-DK"/>
               <a:t>Tredje niveau</a:t>
             </a:r>
           </a:p>
           <a:p>
             <a:pPr lvl="3"/>
             <a:r>
-              <a:rPr lang="da-DK" smtClean="0"/>
+              <a:rPr lang="da-DK"/>
               <a:t>Fjerde niveau</a:t>
             </a:r>
           </a:p>
           <a:p>
             <a:pPr lvl="4"/>
             <a:r>
-              <a:rPr lang="da-DK" smtClean="0"/>
+              <a:rPr lang="da-DK"/>
               <a:t>Femte niveau</a:t>
             </a:r>
-            <a:endParaRPr lang="da-DK"/>
           </a:p>
         </p:txBody>
       </p:sp>
@@ -1215,38 +1204,37 @@
           <a:p>
             <a:pPr lvl="0"/>
             <a:r>
-              <a:rPr lang="da-DK" smtClean="0"/>
+              <a:rPr lang="da-DK"/>
               <a:t>Rediger typografien i masterens</a:t>
             </a:r>
           </a:p>
           <a:p>
             <a:pPr lvl="1"/>
             <a:r>
-              <a:rPr lang="da-DK" smtClean="0"/>
+              <a:rPr lang="da-DK"/>
               <a:t>Andet niveau</a:t>
             </a:r>
           </a:p>
           <a:p>
             <a:pPr lvl="2"/>
             <a:r>
-              <a:rPr lang="da-DK" smtClean="0"/>
+              <a:rPr lang="da-DK"/>
               <a:t>Tredje niveau</a:t>
             </a:r>
           </a:p>
           <a:p>
             <a:pPr lvl="3"/>
             <a:r>
-              <a:rPr lang="da-DK" smtClean="0"/>
+              <a:rPr lang="da-DK"/>
               <a:t>Fjerde niveau</a:t>
             </a:r>
           </a:p>
           <a:p>
             <a:pPr lvl="4"/>
             <a:r>
-              <a:rPr lang="da-DK" smtClean="0"/>
+              <a:rPr lang="da-DK"/>
               <a:t>Femte niveau</a:t>
             </a:r>
-            <a:endParaRPr lang="da-DK"/>
           </a:p>
         </p:txBody>
       </p:sp>
@@ -1267,7 +1255,7 @@
           <a:p>
             <a:fld id="{E15B7D8E-2A20-4C0E-991C-872DBB7459A8}" type="datetimeFigureOut">
               <a:rPr lang="da-DK" smtClean="0"/>
-              <a:t>17-02-2018</a:t>
+              <a:t>12-03-2023</a:t>
             </a:fld>
             <a:endParaRPr lang="da-DK"/>
           </a:p>
@@ -1366,10 +1354,9 @@
           <a:lstStyle/>
           <a:p>
             <a:r>
-              <a:rPr lang="da-DK" smtClean="0"/>
+              <a:rPr lang="da-DK"/>
               <a:t>Klik for at redigere i master</a:t>
             </a:r>
-            <a:endParaRPr lang="da-DK"/>
           </a:p>
         </p:txBody>
       </p:sp>
@@ -1432,7 +1419,7 @@
           <a:p>
             <a:pPr lvl="0"/>
             <a:r>
-              <a:rPr lang="da-DK" smtClean="0"/>
+              <a:rPr lang="da-DK"/>
               <a:t>Rediger typografien i masterens</a:t>
             </a:r>
           </a:p>
@@ -1460,38 +1447,37 @@
           <a:p>
             <a:pPr lvl="0"/>
             <a:r>
-              <a:rPr lang="da-DK" smtClean="0"/>
+              <a:rPr lang="da-DK"/>
               <a:t>Rediger typografien i masterens</a:t>
             </a:r>
           </a:p>
           <a:p>
             <a:pPr lvl="1"/>
             <a:r>
-              <a:rPr lang="da-DK" smtClean="0"/>
+              <a:rPr lang="da-DK"/>
               <a:t>Andet niveau</a:t>
             </a:r>
           </a:p>
           <a:p>
             <a:pPr lvl="2"/>
             <a:r>
-              <a:rPr lang="da-DK" smtClean="0"/>
+              <a:rPr lang="da-DK"/>
               <a:t>Tredje niveau</a:t>
             </a:r>
           </a:p>
           <a:p>
             <a:pPr lvl="3"/>
             <a:r>
-              <a:rPr lang="da-DK" smtClean="0"/>
+              <a:rPr lang="da-DK"/>
               <a:t>Fjerde niveau</a:t>
             </a:r>
           </a:p>
           <a:p>
             <a:pPr lvl="4"/>
             <a:r>
-              <a:rPr lang="da-DK" smtClean="0"/>
+              <a:rPr lang="da-DK"/>
               <a:t>Femte niveau</a:t>
             </a:r>
-            <a:endParaRPr lang="da-DK"/>
           </a:p>
         </p:txBody>
       </p:sp>
@@ -1554,7 +1540,7 @@
           <a:p>
             <a:pPr lvl="0"/>
             <a:r>
-              <a:rPr lang="da-DK" smtClean="0"/>
+              <a:rPr lang="da-DK"/>
               <a:t>Rediger typografien i masterens</a:t>
             </a:r>
           </a:p>
@@ -1582,38 +1568,37 @@
           <a:p>
             <a:pPr lvl="0"/>
             <a:r>
-              <a:rPr lang="da-DK" smtClean="0"/>
+              <a:rPr lang="da-DK"/>
               <a:t>Rediger typografien i masterens</a:t>
             </a:r>
           </a:p>
           <a:p>
             <a:pPr lvl="1"/>
             <a:r>
-              <a:rPr lang="da-DK" smtClean="0"/>
+              <a:rPr lang="da-DK"/>
               <a:t>Andet niveau</a:t>
             </a:r>
           </a:p>
           <a:p>
             <a:pPr lvl="2"/>
             <a:r>
-              <a:rPr lang="da-DK" smtClean="0"/>
+              <a:rPr lang="da-DK"/>
               <a:t>Tredje niveau</a:t>
             </a:r>
           </a:p>
           <a:p>
             <a:pPr lvl="3"/>
             <a:r>
-              <a:rPr lang="da-DK" smtClean="0"/>
+              <a:rPr lang="da-DK"/>
               <a:t>Fjerde niveau</a:t>
             </a:r>
           </a:p>
           <a:p>
             <a:pPr lvl="4"/>
             <a:r>
-              <a:rPr lang="da-DK" smtClean="0"/>
+              <a:rPr lang="da-DK"/>
               <a:t>Femte niveau</a:t>
             </a:r>
-            <a:endParaRPr lang="da-DK"/>
           </a:p>
         </p:txBody>
       </p:sp>
@@ -1634,7 +1619,7 @@
           <a:p>
             <a:fld id="{E15B7D8E-2A20-4C0E-991C-872DBB7459A8}" type="datetimeFigureOut">
               <a:rPr lang="da-DK" smtClean="0"/>
-              <a:t>17-02-2018</a:t>
+              <a:t>12-03-2023</a:t>
             </a:fld>
             <a:endParaRPr lang="da-DK"/>
           </a:p>
@@ -1728,10 +1713,9 @@
           <a:lstStyle/>
           <a:p>
             <a:r>
-              <a:rPr lang="da-DK" smtClean="0"/>
+              <a:rPr lang="da-DK"/>
               <a:t>Klik for at redigere i master</a:t>
             </a:r>
-            <a:endParaRPr lang="da-DK"/>
           </a:p>
         </p:txBody>
       </p:sp>
@@ -1752,7 +1736,7 @@
           <a:p>
             <a:fld id="{E15B7D8E-2A20-4C0E-991C-872DBB7459A8}" type="datetimeFigureOut">
               <a:rPr lang="da-DK" smtClean="0"/>
-              <a:t>17-02-2018</a:t>
+              <a:t>12-03-2023</a:t>
             </a:fld>
             <a:endParaRPr lang="da-DK"/>
           </a:p>
@@ -1847,7 +1831,7 @@
           <a:p>
             <a:fld id="{E15B7D8E-2A20-4C0E-991C-872DBB7459A8}" type="datetimeFigureOut">
               <a:rPr lang="da-DK" smtClean="0"/>
-              <a:t>17-02-2018</a:t>
+              <a:t>12-03-2023</a:t>
             </a:fld>
             <a:endParaRPr lang="da-DK"/>
           </a:p>
@@ -1950,10 +1934,9 @@
           </a:lstStyle>
           <a:p>
             <a:r>
-              <a:rPr lang="da-DK" smtClean="0"/>
+              <a:rPr lang="da-DK"/>
               <a:t>Klik for at redigere i master</a:t>
             </a:r>
-            <a:endParaRPr lang="da-DK"/>
           </a:p>
         </p:txBody>
       </p:sp>
@@ -2007,38 +1990,37 @@
           <a:p>
             <a:pPr lvl="0"/>
             <a:r>
-              <a:rPr lang="da-DK" smtClean="0"/>
+              <a:rPr lang="da-DK"/>
               <a:t>Rediger typografien i masterens</a:t>
             </a:r>
           </a:p>
           <a:p>
             <a:pPr lvl="1"/>
             <a:r>
-              <a:rPr lang="da-DK" smtClean="0"/>
+              <a:rPr lang="da-DK"/>
               <a:t>Andet niveau</a:t>
             </a:r>
           </a:p>
           <a:p>
             <a:pPr lvl="2"/>
             <a:r>
-              <a:rPr lang="da-DK" smtClean="0"/>
+              <a:rPr lang="da-DK"/>
               <a:t>Tredje niveau</a:t>
             </a:r>
           </a:p>
           <a:p>
             <a:pPr lvl="3"/>
             <a:r>
-              <a:rPr lang="da-DK" smtClean="0"/>
+              <a:rPr lang="da-DK"/>
               <a:t>Fjerde niveau</a:t>
             </a:r>
           </a:p>
           <a:p>
             <a:pPr lvl="4"/>
             <a:r>
-              <a:rPr lang="da-DK" smtClean="0"/>
+              <a:rPr lang="da-DK"/>
               <a:t>Femte niveau</a:t>
             </a:r>
-            <a:endParaRPr lang="da-DK"/>
           </a:p>
         </p:txBody>
       </p:sp>
@@ -2101,7 +2083,7 @@
           <a:p>
             <a:pPr lvl="0"/>
             <a:r>
-              <a:rPr lang="da-DK" smtClean="0"/>
+              <a:rPr lang="da-DK"/>
               <a:t>Rediger typografien i masterens</a:t>
             </a:r>
           </a:p>
@@ -2124,7 +2106,7 @@
           <a:p>
             <a:fld id="{E15B7D8E-2A20-4C0E-991C-872DBB7459A8}" type="datetimeFigureOut">
               <a:rPr lang="da-DK" smtClean="0"/>
-              <a:t>17-02-2018</a:t>
+              <a:t>12-03-2023</a:t>
             </a:fld>
             <a:endParaRPr lang="da-DK"/>
           </a:p>
@@ -2227,10 +2209,9 @@
           </a:lstStyle>
           <a:p>
             <a:r>
-              <a:rPr lang="da-DK" smtClean="0"/>
+              <a:rPr lang="da-DK"/>
               <a:t>Klik for at redigere i master</a:t>
             </a:r>
-            <a:endParaRPr lang="da-DK"/>
           </a:p>
         </p:txBody>
       </p:sp>
@@ -2354,7 +2335,7 @@
           <a:p>
             <a:pPr lvl="0"/>
             <a:r>
-              <a:rPr lang="da-DK" smtClean="0"/>
+              <a:rPr lang="da-DK"/>
               <a:t>Rediger typografien i masterens</a:t>
             </a:r>
           </a:p>
@@ -2377,7 +2358,7 @@
           <a:p>
             <a:fld id="{E15B7D8E-2A20-4C0E-991C-872DBB7459A8}" type="datetimeFigureOut">
               <a:rPr lang="da-DK" smtClean="0"/>
-              <a:t>17-02-2018</a:t>
+              <a:t>12-03-2023</a:t>
             </a:fld>
             <a:endParaRPr lang="da-DK"/>
           </a:p>
@@ -2486,10 +2467,9 @@
           <a:lstStyle/>
           <a:p>
             <a:r>
-              <a:rPr lang="da-DK" smtClean="0"/>
+              <a:rPr lang="da-DK"/>
               <a:t>Klik for at redigere i master</a:t>
             </a:r>
-            <a:endParaRPr lang="da-DK"/>
           </a:p>
         </p:txBody>
       </p:sp>
@@ -2520,38 +2500,37 @@
           <a:p>
             <a:pPr lvl="0"/>
             <a:r>
-              <a:rPr lang="da-DK" smtClean="0"/>
+              <a:rPr lang="da-DK"/>
               <a:t>Rediger typografien i masterens</a:t>
             </a:r>
           </a:p>
           <a:p>
             <a:pPr lvl="1"/>
             <a:r>
-              <a:rPr lang="da-DK" smtClean="0"/>
+              <a:rPr lang="da-DK"/>
               <a:t>Andet niveau</a:t>
             </a:r>
           </a:p>
           <a:p>
             <a:pPr lvl="2"/>
             <a:r>
-              <a:rPr lang="da-DK" smtClean="0"/>
+              <a:rPr lang="da-DK"/>
               <a:t>Tredje niveau</a:t>
             </a:r>
           </a:p>
           <a:p>
             <a:pPr lvl="3"/>
             <a:r>
-              <a:rPr lang="da-DK" smtClean="0"/>
+              <a:rPr lang="da-DK"/>
               <a:t>Fjerde niveau</a:t>
             </a:r>
           </a:p>
           <a:p>
             <a:pPr lvl="4"/>
             <a:r>
-              <a:rPr lang="da-DK" smtClean="0"/>
+              <a:rPr lang="da-DK"/>
               <a:t>Femte niveau</a:t>
             </a:r>
-            <a:endParaRPr lang="da-DK"/>
           </a:p>
         </p:txBody>
       </p:sp>
@@ -2590,7 +2569,7 @@
           <a:p>
             <a:fld id="{E15B7D8E-2A20-4C0E-991C-872DBB7459A8}" type="datetimeFigureOut">
               <a:rPr lang="da-DK" smtClean="0"/>
-              <a:t>17-02-2018</a:t>
+              <a:t>12-03-2023</a:t>
             </a:fld>
             <a:endParaRPr lang="da-DK"/>
           </a:p>
@@ -3018,10 +2997,9 @@
           <a:lstStyle/>
           <a:p>
             <a:r>
-              <a:rPr lang="da-DK" sz="16000" smtClean="0"/>
+              <a:rPr lang="da-DK" sz="16000"/>
               <a:t>Unit Tests</a:t>
             </a:r>
-            <a:endParaRPr lang="da-DK" sz="16000"/>
           </a:p>
         </p:txBody>
       </p:sp>
@@ -3035,13 +3013,6 @@
   <p:clrMapOvr>
     <a:masterClrMapping/>
   </p:clrMapOvr>
-  <p:timing>
-    <p:tnLst>
-      <p:par>
-        <p:cTn id="1" dur="indefinite" restart="never" nodeType="tmRoot"/>
-      </p:par>
-    </p:tnLst>
-  </p:timing>
 </p:sld>
 </file>
 
@@ -3096,21 +3067,6 @@
   <p:clrMapOvr>
     <a:masterClrMapping/>
   </p:clrMapOvr>
-  <mc:AlternateContent xmlns:mc="http://schemas.openxmlformats.org/markup-compatibility/2006" xmlns:p14="http://schemas.microsoft.com/office/powerpoint/2010/main">
-    <mc:Choice Requires="p14">
-      <p:transition p14:dur="0"/>
-    </mc:Choice>
-    <mc:Fallback xmlns="">
-      <p:transition/>
-    </mc:Fallback>
-  </mc:AlternateContent>
-  <p:timing>
-    <p:tnLst>
-      <p:par>
-        <p:cTn id="1" dur="indefinite" restart="never" nodeType="tmRoot"/>
-      </p:par>
-    </p:tnLst>
-  </p:timing>
 </p:sld>
 </file>
 
@@ -3165,21 +3121,6 @@
   <p:clrMapOvr>
     <a:masterClrMapping/>
   </p:clrMapOvr>
-  <mc:AlternateContent xmlns:mc="http://schemas.openxmlformats.org/markup-compatibility/2006" xmlns:p14="http://schemas.microsoft.com/office/powerpoint/2010/main">
-    <mc:Choice Requires="p14">
-      <p:transition p14:dur="0"/>
-    </mc:Choice>
-    <mc:Fallback xmlns="">
-      <p:transition/>
-    </mc:Fallback>
-  </mc:AlternateContent>
-  <p:timing>
-    <p:tnLst>
-      <p:par>
-        <p:cTn id="1" dur="indefinite" restart="never" nodeType="tmRoot"/>
-      </p:par>
-    </p:tnLst>
-  </p:timing>
 </p:sld>
 </file>
 
@@ -3202,8 +3143,16 @@
       </p:grpSpPr>
       <p:pic>
         <p:nvPicPr>
-          <p:cNvPr id="3" name="Billede 2"/>
-          <p:cNvPicPr/>
+          <p:cNvPr id="2" name="Billede 1">
+            <a:extLst>
+              <a:ext uri="{FF2B5EF4-FFF2-40B4-BE49-F238E27FC236}">
+                <a16:creationId xmlns:a16="http://schemas.microsoft.com/office/drawing/2014/main" id="{98171F7A-845A-4940-B147-418EE3405ECF}"/>
+              </a:ext>
+            </a:extLst>
+          </p:cNvPr>
+          <p:cNvPicPr>
+            <a:picLocks noChangeAspect="1"/>
+          </p:cNvPicPr>
           <p:nvPr/>
         </p:nvPicPr>
         <p:blipFill>
@@ -3214,8 +3163,8 @@
         </p:blipFill>
         <p:spPr>
           <a:xfrm>
-            <a:off x="2692567" y="859940"/>
-            <a:ext cx="7004886" cy="4602397"/>
+            <a:off x="239992" y="1564104"/>
+            <a:ext cx="11510517" cy="3665621"/>
           </a:xfrm>
           <a:prstGeom prst="rect">
             <a:avLst/>
@@ -3232,21 +3181,6 @@
   <p:clrMapOvr>
     <a:masterClrMapping/>
   </p:clrMapOvr>
-  <mc:AlternateContent xmlns:mc="http://schemas.openxmlformats.org/markup-compatibility/2006" xmlns:p14="http://schemas.microsoft.com/office/powerpoint/2010/main">
-    <mc:Choice Requires="p14">
-      <p:transition p14:dur="0"/>
-    </mc:Choice>
-    <mc:Fallback xmlns="">
-      <p:transition/>
-    </mc:Fallback>
-  </mc:AlternateContent>
-  <p:timing>
-    <p:tnLst>
-      <p:par>
-        <p:cTn id="1" dur="indefinite" restart="never" nodeType="tmRoot"/>
-      </p:par>
-    </p:tnLst>
-  </p:timing>
 </p:sld>
 </file>
 
@@ -3269,8 +3203,16 @@
       </p:grpSpPr>
       <p:pic>
         <p:nvPicPr>
-          <p:cNvPr id="4" name="Billede 3"/>
-          <p:cNvPicPr/>
+          <p:cNvPr id="2" name="Billede 1">
+            <a:extLst>
+              <a:ext uri="{FF2B5EF4-FFF2-40B4-BE49-F238E27FC236}">
+                <a16:creationId xmlns:a16="http://schemas.microsoft.com/office/drawing/2014/main" id="{27C36E09-3004-47E1-A3E5-4916ABEE268D}"/>
+              </a:ext>
+            </a:extLst>
+          </p:cNvPr>
+          <p:cNvPicPr>
+            <a:picLocks noChangeAspect="1"/>
+          </p:cNvPicPr>
           <p:nvPr/>
         </p:nvPicPr>
         <p:blipFill>
@@ -3281,8 +3223,8 @@
         </p:blipFill>
         <p:spPr>
           <a:xfrm>
-            <a:off x="1826460" y="584383"/>
-            <a:ext cx="7305508" cy="4270359"/>
+            <a:off x="617800" y="1684420"/>
+            <a:ext cx="11359395" cy="3617495"/>
           </a:xfrm>
           <a:prstGeom prst="rect">
             <a:avLst/>
@@ -3299,21 +3241,6 @@
   <p:clrMapOvr>
     <a:masterClrMapping/>
   </p:clrMapOvr>
-  <mc:AlternateContent xmlns:mc="http://schemas.openxmlformats.org/markup-compatibility/2006" xmlns:p14="http://schemas.microsoft.com/office/powerpoint/2010/main">
-    <mc:Choice Requires="p14">
-      <p:transition p14:dur="0"/>
-    </mc:Choice>
-    <mc:Fallback xmlns="">
-      <p:transition/>
-    </mc:Fallback>
-  </mc:AlternateContent>
-  <p:timing>
-    <p:tnLst>
-      <p:par>
-        <p:cTn id="1" dur="indefinite" restart="never" nodeType="tmRoot"/>
-      </p:par>
-    </p:tnLst>
-  </p:timing>
 </p:sld>
 </file>
 
@@ -3336,8 +3263,16 @@
       </p:grpSpPr>
       <p:pic>
         <p:nvPicPr>
-          <p:cNvPr id="3" name="Billede 2"/>
-          <p:cNvPicPr/>
+          <p:cNvPr id="2" name="Billede 1">
+            <a:extLst>
+              <a:ext uri="{FF2B5EF4-FFF2-40B4-BE49-F238E27FC236}">
+                <a16:creationId xmlns:a16="http://schemas.microsoft.com/office/drawing/2014/main" id="{85E3953E-6560-4C5C-9A28-1604524DA10E}"/>
+              </a:ext>
+            </a:extLst>
+          </p:cNvPr>
+          <p:cNvPicPr>
+            <a:picLocks noChangeAspect="1"/>
+          </p:cNvPicPr>
           <p:nvPr/>
         </p:nvPicPr>
         <p:blipFill>
@@ -3348,8 +3283,8 @@
         </p:blipFill>
         <p:spPr>
           <a:xfrm>
-            <a:off x="2045536" y="585136"/>
-            <a:ext cx="7164638" cy="5208070"/>
+            <a:off x="497304" y="1881294"/>
+            <a:ext cx="11373853" cy="3681037"/>
           </a:xfrm>
           <a:prstGeom prst="rect">
             <a:avLst/>
@@ -3366,92 +3301,10 @@
   <p:clrMapOvr>
     <a:masterClrMapping/>
   </p:clrMapOvr>
-  <mc:AlternateContent xmlns:mc="http://schemas.openxmlformats.org/markup-compatibility/2006" xmlns:p14="http://schemas.microsoft.com/office/powerpoint/2010/main">
-    <mc:Choice Requires="p14">
-      <p:transition p14:dur="0"/>
-    </mc:Choice>
-    <mc:Fallback xmlns="">
-      <p:transition/>
-    </mc:Fallback>
-  </mc:AlternateContent>
-  <p:timing>
-    <p:tnLst>
-      <p:par>
-        <p:cTn id="1" dur="indefinite" restart="never" nodeType="tmRoot"/>
-      </p:par>
-    </p:tnLst>
-  </p:timing>
 </p:sld>
 </file>
 
 <file path=ppt/slides/slide15.xml><?xml version="1.0" encoding="utf-8"?>
-<p:sld xmlns:a="http://schemas.openxmlformats.org/drawingml/2006/main" xmlns:r="http://schemas.openxmlformats.org/officeDocument/2006/relationships" xmlns:p="http://schemas.openxmlformats.org/presentationml/2006/main">
-  <p:cSld>
-    <p:spTree>
-      <p:nvGrpSpPr>
-        <p:cNvPr id="1" name=""/>
-        <p:cNvGrpSpPr/>
-        <p:nvPr/>
-      </p:nvGrpSpPr>
-      <p:grpSpPr>
-        <a:xfrm>
-          <a:off x="0" y="0"/>
-          <a:ext cx="0" cy="0"/>
-          <a:chOff x="0" y="0"/>
-          <a:chExt cx="0" cy="0"/>
-        </a:xfrm>
-      </p:grpSpPr>
-      <p:pic>
-        <p:nvPicPr>
-          <p:cNvPr id="4" name="Billede 3"/>
-          <p:cNvPicPr/>
-          <p:nvPr/>
-        </p:nvPicPr>
-        <p:blipFill>
-          <a:blip r:embed="rId2"/>
-          <a:stretch>
-            <a:fillRect/>
-          </a:stretch>
-        </p:blipFill>
-        <p:spPr>
-          <a:xfrm>
-            <a:off x="2035007" y="1005573"/>
-            <a:ext cx="7469940" cy="4865838"/>
-          </a:xfrm>
-          <a:prstGeom prst="rect">
-            <a:avLst/>
-          </a:prstGeom>
-        </p:spPr>
-      </p:pic>
-    </p:spTree>
-    <p:extLst>
-      <p:ext uri="{BB962C8B-B14F-4D97-AF65-F5344CB8AC3E}">
-        <p14:creationId xmlns:p14="http://schemas.microsoft.com/office/powerpoint/2010/main" val="164757010"/>
-      </p:ext>
-    </p:extLst>
-  </p:cSld>
-  <p:clrMapOvr>
-    <a:masterClrMapping/>
-  </p:clrMapOvr>
-  <mc:AlternateContent xmlns:mc="http://schemas.openxmlformats.org/markup-compatibility/2006" xmlns:p14="http://schemas.microsoft.com/office/powerpoint/2010/main">
-    <mc:Choice Requires="p14">
-      <p:transition p14:dur="0"/>
-    </mc:Choice>
-    <mc:Fallback xmlns="">
-      <p:transition/>
-    </mc:Fallback>
-  </mc:AlternateContent>
-  <p:timing>
-    <p:tnLst>
-      <p:par>
-        <p:cTn id="1" dur="indefinite" restart="never" nodeType="tmRoot"/>
-      </p:par>
-    </p:tnLst>
-  </p:timing>
-</p:sld>
-</file>
-
-<file path=ppt/slides/slide16.xml><?xml version="1.0" encoding="utf-8"?>
 <p:sld xmlns:a="http://schemas.openxmlformats.org/drawingml/2006/main" xmlns:r="http://schemas.openxmlformats.org/officeDocument/2006/relationships" xmlns:p="http://schemas.openxmlformats.org/presentationml/2006/main">
   <p:cSld>
     <p:spTree>
@@ -3502,25 +3355,10 @@
   <p:clrMapOvr>
     <a:masterClrMapping/>
   </p:clrMapOvr>
-  <mc:AlternateContent xmlns:mc="http://schemas.openxmlformats.org/markup-compatibility/2006" xmlns:p14="http://schemas.microsoft.com/office/powerpoint/2010/main">
-    <mc:Choice Requires="p14">
-      <p:transition p14:dur="0"/>
-    </mc:Choice>
-    <mc:Fallback xmlns="">
-      <p:transition/>
-    </mc:Fallback>
-  </mc:AlternateContent>
-  <p:timing>
-    <p:tnLst>
-      <p:par>
-        <p:cTn id="1" dur="indefinite" restart="never" nodeType="tmRoot"/>
-      </p:par>
-    </p:tnLst>
-  </p:timing>
 </p:sld>
 </file>
 
-<file path=ppt/slides/slide17.xml><?xml version="1.0" encoding="utf-8"?>
+<file path=ppt/slides/slide16.xml><?xml version="1.0" encoding="utf-8"?>
 <p:sld xmlns:a="http://schemas.openxmlformats.org/drawingml/2006/main" xmlns:r="http://schemas.openxmlformats.org/officeDocument/2006/relationships" xmlns:p="http://schemas.openxmlformats.org/presentationml/2006/main">
   <p:cSld>
     <p:spTree>
@@ -3553,10 +3391,9 @@
           <a:lstStyle/>
           <a:p>
             <a:r>
-              <a:rPr lang="da-DK" b="1" smtClean="0"/>
+              <a:rPr lang="da-DK" b="1"/>
               <a:t>Live Unit Testing</a:t>
             </a:r>
-            <a:endParaRPr lang="da-DK" b="1"/>
           </a:p>
         </p:txBody>
       </p:sp>
@@ -3576,25 +3413,19 @@
           <a:lstStyle/>
           <a:p>
             <a:r>
-              <a:rPr lang="da-DK" smtClean="0"/>
+              <a:rPr lang="da-DK"/>
               <a:t>Runs in the background while you write code</a:t>
             </a:r>
-            <a:endParaRPr lang="da-DK" smtClean="0"/>
-          </a:p>
-          <a:p>
-            <a:r>
-              <a:rPr lang="da-DK" smtClean="0"/>
-              <a:t>Real-time </a:t>
-            </a:r>
-            <a:r>
-              <a:rPr lang="da-DK" smtClean="0"/>
-              <a:t>feedback</a:t>
-            </a:r>
-            <a:endParaRPr lang="da-DK" smtClean="0"/>
-          </a:p>
-          <a:p>
-            <a:r>
-              <a:rPr lang="en-US" smtClean="0"/>
+          </a:p>
+          <a:p>
+            <a:r>
+              <a:rPr lang="da-DK"/>
+              <a:t>Real-time feedback</a:t>
+            </a:r>
+          </a:p>
+          <a:p>
+            <a:r>
+              <a:rPr lang="en-US"/>
               <a:t>Enable by choosing </a:t>
             </a:r>
             <a:r>
@@ -3619,17 +3450,10 @@
   <p:clrMapOvr>
     <a:masterClrMapping/>
   </p:clrMapOvr>
-  <p:timing>
-    <p:tnLst>
-      <p:par>
-        <p:cTn id="1" dur="indefinite" restart="never" nodeType="tmRoot"/>
-      </p:par>
-    </p:tnLst>
-  </p:timing>
 </p:sld>
 </file>
 
-<file path=ppt/slides/slide18.xml><?xml version="1.0" encoding="utf-8"?>
+<file path=ppt/slides/slide17.xml><?xml version="1.0" encoding="utf-8"?>
 <p:sld xmlns:a="http://schemas.openxmlformats.org/drawingml/2006/main" xmlns:r="http://schemas.openxmlformats.org/officeDocument/2006/relationships" xmlns:p="http://schemas.openxmlformats.org/presentationml/2006/main">
   <p:cSld>
     <p:spTree>
@@ -3678,25 +3502,10 @@
   <p:clrMapOvr>
     <a:masterClrMapping/>
   </p:clrMapOvr>
-  <mc:AlternateContent xmlns:mc="http://schemas.openxmlformats.org/markup-compatibility/2006" xmlns:p14="http://schemas.microsoft.com/office/powerpoint/2010/main">
-    <mc:Choice Requires="p14">
-      <p:transition p14:dur="0"/>
-    </mc:Choice>
-    <mc:Fallback xmlns="">
-      <p:transition/>
-    </mc:Fallback>
-  </mc:AlternateContent>
-  <p:timing>
-    <p:tnLst>
-      <p:par>
-        <p:cTn id="1" dur="indefinite" restart="never" nodeType="tmRoot"/>
-      </p:par>
-    </p:tnLst>
-  </p:timing>
 </p:sld>
 </file>
 
-<file path=ppt/slides/slide19.xml><?xml version="1.0" encoding="utf-8"?>
+<file path=ppt/slides/slide18.xml><?xml version="1.0" encoding="utf-8"?>
 <p:sld xmlns:a="http://schemas.openxmlformats.org/drawingml/2006/main" xmlns:r="http://schemas.openxmlformats.org/officeDocument/2006/relationships" xmlns:p="http://schemas.openxmlformats.org/presentationml/2006/main">
   <p:cSld>
     <p:spTree>
@@ -3745,194 +3554,10 @@
   <p:clrMapOvr>
     <a:masterClrMapping/>
   </p:clrMapOvr>
-  <mc:AlternateContent xmlns:mc="http://schemas.openxmlformats.org/markup-compatibility/2006" xmlns:p14="http://schemas.microsoft.com/office/powerpoint/2010/main">
-    <mc:Choice Requires="p14">
-      <p:transition p14:dur="0"/>
-    </mc:Choice>
-    <mc:Fallback xmlns="">
-      <p:transition/>
-    </mc:Fallback>
-  </mc:AlternateContent>
-  <p:timing>
-    <p:tnLst>
-      <p:par>
-        <p:cTn id="1" dur="indefinite" restart="never" nodeType="tmRoot"/>
-      </p:par>
-    </p:tnLst>
-  </p:timing>
 </p:sld>
 </file>
 
-<file path=ppt/slides/slide2.xml><?xml version="1.0" encoding="utf-8"?>
-<p:sld xmlns:a="http://schemas.openxmlformats.org/drawingml/2006/main" xmlns:r="http://schemas.openxmlformats.org/officeDocument/2006/relationships" xmlns:p="http://schemas.openxmlformats.org/presentationml/2006/main">
-  <p:cSld>
-    <p:spTree>
-      <p:nvGrpSpPr>
-        <p:cNvPr id="1" name=""/>
-        <p:cNvGrpSpPr/>
-        <p:nvPr/>
-      </p:nvGrpSpPr>
-      <p:grpSpPr>
-        <a:xfrm>
-          <a:off x="0" y="0"/>
-          <a:ext cx="0" cy="0"/>
-          <a:chOff x="0" y="0"/>
-          <a:chExt cx="0" cy="0"/>
-        </a:xfrm>
-      </p:grpSpPr>
-      <p:sp>
-        <p:nvSpPr>
-          <p:cNvPr id="2" name="Titel 1"/>
-          <p:cNvSpPr>
-            <a:spLocks noGrp="1"/>
-          </p:cNvSpPr>
-          <p:nvPr>
-            <p:ph type="title"/>
-          </p:nvPr>
-        </p:nvSpPr>
-        <p:spPr/>
-        <p:txBody>
-          <a:bodyPr/>
-          <a:lstStyle/>
-          <a:p>
-            <a:r>
-              <a:rPr lang="da-DK" smtClean="0"/>
-              <a:t>Test-Driven Development (TDD)</a:t>
-            </a:r>
-            <a:endParaRPr lang="da-DK"/>
-          </a:p>
-        </p:txBody>
-      </p:sp>
-      <p:sp>
-        <p:nvSpPr>
-          <p:cNvPr id="3" name="Pladsholder til indhold 2"/>
-          <p:cNvSpPr>
-            <a:spLocks noGrp="1"/>
-          </p:cNvSpPr>
-          <p:nvPr>
-            <p:ph idx="1"/>
-          </p:nvPr>
-        </p:nvSpPr>
-        <p:spPr/>
-        <p:txBody>
-          <a:bodyPr/>
-          <a:lstStyle/>
-          <a:p>
-            <a:pPr marL="514350" indent="-514350">
-              <a:buFont typeface="+mj-lt"/>
-              <a:buAutoNum type="arabicPeriod"/>
-            </a:pPr>
-            <a:r>
-              <a:rPr lang="da-DK" b="1" smtClean="0"/>
-              <a:t>Write </a:t>
-            </a:r>
-            <a:r>
-              <a:rPr lang="da-DK" b="1" smtClean="0"/>
-              <a:t>Unit </a:t>
-            </a:r>
-            <a:r>
-              <a:rPr lang="da-DK" b="1" smtClean="0"/>
-              <a:t>Tests </a:t>
-            </a:r>
-            <a:r>
-              <a:rPr lang="da-DK" smtClean="0"/>
-              <a:t>based on requirement specifications</a:t>
-            </a:r>
-            <a:endParaRPr lang="da-DK" smtClean="0"/>
-          </a:p>
-          <a:p>
-            <a:pPr marL="514350" indent="-514350">
-              <a:buFont typeface="+mj-lt"/>
-              <a:buAutoNum type="arabicPeriod"/>
-            </a:pPr>
-            <a:r>
-              <a:rPr lang="da-DK" b="1" smtClean="0"/>
-              <a:t>Write code </a:t>
-            </a:r>
-            <a:r>
-              <a:rPr lang="da-DK" smtClean="0"/>
-              <a:t>(goal: turn all Unit Tests green)</a:t>
-            </a:r>
-            <a:endParaRPr lang="da-DK" smtClean="0"/>
-          </a:p>
-          <a:p>
-            <a:pPr marL="514350" indent="-514350">
-              <a:buFont typeface="+mj-lt"/>
-              <a:buAutoNum type="arabicPeriod"/>
-            </a:pPr>
-            <a:r>
-              <a:rPr lang="da-DK" b="1" smtClean="0"/>
-              <a:t>Run Unit Tests</a:t>
-            </a:r>
-            <a:r>
-              <a:rPr lang="da-DK" smtClean="0"/>
-              <a:t>: if any tests fail, go to 2</a:t>
-            </a:r>
-            <a:endParaRPr lang="da-DK" smtClean="0"/>
-          </a:p>
-          <a:p>
-            <a:pPr marL="514350" indent="-514350">
-              <a:buFont typeface="+mj-lt"/>
-              <a:buAutoNum type="arabicPeriod"/>
-            </a:pPr>
-            <a:r>
-              <a:rPr lang="da-DK" b="1" smtClean="0"/>
-              <a:t>Refactor code</a:t>
-            </a:r>
-            <a:r>
-              <a:rPr lang="da-DK" smtClean="0"/>
-              <a:t>. Goals:</a:t>
-            </a:r>
-            <a:endParaRPr lang="da-DK" smtClean="0"/>
-          </a:p>
-          <a:p>
-            <a:pPr lvl="1"/>
-            <a:r>
-              <a:rPr lang="da-DK" smtClean="0"/>
-              <a:t>Increase code quality </a:t>
-            </a:r>
-            <a:r>
-              <a:rPr lang="da-DK" smtClean="0"/>
-              <a:t>(?)</a:t>
-            </a:r>
-          </a:p>
-          <a:p>
-            <a:pPr lvl="1"/>
-            <a:r>
-              <a:rPr lang="da-DK" smtClean="0"/>
-              <a:t>Keep all Unit Tests green</a:t>
-            </a:r>
-            <a:endParaRPr lang="da-DK" smtClean="0"/>
-          </a:p>
-          <a:p>
-            <a:pPr marL="0" indent="0">
-              <a:buNone/>
-            </a:pPr>
-            <a:endParaRPr lang="da-DK"/>
-          </a:p>
-        </p:txBody>
-      </p:sp>
-    </p:spTree>
-    <p:extLst>
-      <p:ext uri="{BB962C8B-B14F-4D97-AF65-F5344CB8AC3E}">
-        <p14:creationId xmlns:p14="http://schemas.microsoft.com/office/powerpoint/2010/main" val="3763058360"/>
-      </p:ext>
-    </p:extLst>
-  </p:cSld>
-  <p:clrMapOvr>
-    <a:masterClrMapping/>
-  </p:clrMapOvr>
-  <p:timing>
-    <p:tnLst>
-      <p:par>
-        <p:cTn id="1" dur="indefinite" restart="never" nodeType="tmRoot"/>
-      </p:par>
-    </p:tnLst>
-  </p:timing>
-</p:sld>
-</file>
-
-<file path=ppt/slides/slide20.xml><?xml version="1.0" encoding="utf-8"?>
+<file path=ppt/slides/slide19.xml><?xml version="1.0" encoding="utf-8"?>
 <p:sld xmlns:a="http://schemas.openxmlformats.org/drawingml/2006/main" xmlns:r="http://schemas.openxmlformats.org/officeDocument/2006/relationships" xmlns:p="http://schemas.openxmlformats.org/presentationml/2006/main">
   <p:cSld>
     <p:spTree>
@@ -3981,21 +3606,310 @@
   <p:clrMapOvr>
     <a:masterClrMapping/>
   </p:clrMapOvr>
-  <mc:AlternateContent xmlns:mc="http://schemas.openxmlformats.org/markup-compatibility/2006" xmlns:p14="http://schemas.microsoft.com/office/powerpoint/2010/main">
-    <mc:Choice Requires="p14">
-      <p:transition p14:dur="0"/>
-    </mc:Choice>
-    <mc:Fallback xmlns="">
-      <p:transition/>
-    </mc:Fallback>
-  </mc:AlternateContent>
-  <p:timing>
-    <p:tnLst>
-      <p:par>
-        <p:cTn id="1" dur="indefinite" restart="never" nodeType="tmRoot"/>
-      </p:par>
-    </p:tnLst>
-  </p:timing>
+</p:sld>
+</file>
+
+<file path=ppt/slides/slide2.xml><?xml version="1.0" encoding="utf-8"?>
+<p:sld xmlns:a="http://schemas.openxmlformats.org/drawingml/2006/main" xmlns:r="http://schemas.openxmlformats.org/officeDocument/2006/relationships" xmlns:p="http://schemas.openxmlformats.org/presentationml/2006/main">
+  <p:cSld>
+    <p:spTree>
+      <p:nvGrpSpPr>
+        <p:cNvPr id="1" name=""/>
+        <p:cNvGrpSpPr/>
+        <p:nvPr/>
+      </p:nvGrpSpPr>
+      <p:grpSpPr>
+        <a:xfrm>
+          <a:off x="0" y="0"/>
+          <a:ext cx="0" cy="0"/>
+          <a:chOff x="0" y="0"/>
+          <a:chExt cx="0" cy="0"/>
+        </a:xfrm>
+      </p:grpSpPr>
+      <p:sp>
+        <p:nvSpPr>
+          <p:cNvPr id="2" name="Titel 1"/>
+          <p:cNvSpPr>
+            <a:spLocks noGrp="1"/>
+          </p:cNvSpPr>
+          <p:nvPr>
+            <p:ph type="title"/>
+          </p:nvPr>
+        </p:nvSpPr>
+        <p:spPr/>
+        <p:txBody>
+          <a:bodyPr/>
+          <a:lstStyle/>
+          <a:p>
+            <a:r>
+              <a:rPr lang="da-DK"/>
+              <a:t>Test-Driven Development (TDD)</a:t>
+            </a:r>
+          </a:p>
+        </p:txBody>
+      </p:sp>
+      <p:sp>
+        <p:nvSpPr>
+          <p:cNvPr id="3" name="Pladsholder til indhold 2"/>
+          <p:cNvSpPr>
+            <a:spLocks noGrp="1"/>
+          </p:cNvSpPr>
+          <p:nvPr>
+            <p:ph idx="1"/>
+          </p:nvPr>
+        </p:nvSpPr>
+        <p:spPr/>
+        <p:txBody>
+          <a:bodyPr/>
+          <a:lstStyle/>
+          <a:p>
+            <a:pPr marL="514350" indent="-514350">
+              <a:buFont typeface="+mj-lt"/>
+              <a:buAutoNum type="arabicPeriod"/>
+            </a:pPr>
+            <a:r>
+              <a:rPr lang="da-DK" b="1"/>
+              <a:t>Write Unit Tests </a:t>
+            </a:r>
+            <a:r>
+              <a:rPr lang="da-DK"/>
+              <a:t>based on requirement specifications</a:t>
+            </a:r>
+          </a:p>
+          <a:p>
+            <a:pPr marL="514350" indent="-514350">
+              <a:buFont typeface="+mj-lt"/>
+              <a:buAutoNum type="arabicPeriod"/>
+            </a:pPr>
+            <a:r>
+              <a:rPr lang="da-DK" b="1"/>
+              <a:t>Write code </a:t>
+            </a:r>
+            <a:r>
+              <a:rPr lang="da-DK"/>
+              <a:t>(goal: turn all Unit Tests green)</a:t>
+            </a:r>
+          </a:p>
+          <a:p>
+            <a:pPr marL="514350" indent="-514350">
+              <a:buFont typeface="+mj-lt"/>
+              <a:buAutoNum type="arabicPeriod"/>
+            </a:pPr>
+            <a:r>
+              <a:rPr lang="da-DK" b="1"/>
+              <a:t>Run Unit Tests</a:t>
+            </a:r>
+            <a:r>
+              <a:rPr lang="da-DK"/>
+              <a:t>: if any tests fail, go to 2</a:t>
+            </a:r>
+          </a:p>
+          <a:p>
+            <a:pPr marL="514350" indent="-514350">
+              <a:buFont typeface="+mj-lt"/>
+              <a:buAutoNum type="arabicPeriod"/>
+            </a:pPr>
+            <a:r>
+              <a:rPr lang="da-DK" b="1"/>
+              <a:t>Refactor code</a:t>
+            </a:r>
+            <a:r>
+              <a:rPr lang="da-DK"/>
+              <a:t>. Goals:</a:t>
+            </a:r>
+          </a:p>
+          <a:p>
+            <a:pPr lvl="1"/>
+            <a:r>
+              <a:rPr lang="da-DK"/>
+              <a:t>Increase code quality (?)</a:t>
+            </a:r>
+          </a:p>
+          <a:p>
+            <a:pPr lvl="1"/>
+            <a:r>
+              <a:rPr lang="da-DK"/>
+              <a:t>Keep all Unit Tests green</a:t>
+            </a:r>
+          </a:p>
+          <a:p>
+            <a:pPr marL="0" indent="0">
+              <a:buNone/>
+            </a:pPr>
+            <a:endParaRPr lang="da-DK"/>
+          </a:p>
+        </p:txBody>
+      </p:sp>
+    </p:spTree>
+    <p:extLst>
+      <p:ext uri="{BB962C8B-B14F-4D97-AF65-F5344CB8AC3E}">
+        <p14:creationId xmlns:p14="http://schemas.microsoft.com/office/powerpoint/2010/main" val="3763058360"/>
+      </p:ext>
+    </p:extLst>
+  </p:cSld>
+  <p:clrMapOvr>
+    <a:masterClrMapping/>
+  </p:clrMapOvr>
+</p:sld>
+</file>
+
+<file path=ppt/slides/slide20.xml><?xml version="1.0" encoding="utf-8"?>
+<p:sld xmlns:a="http://schemas.openxmlformats.org/drawingml/2006/main" xmlns:r="http://schemas.openxmlformats.org/officeDocument/2006/relationships" xmlns:p="http://schemas.openxmlformats.org/presentationml/2006/main">
+  <p:cSld>
+    <p:spTree>
+      <p:nvGrpSpPr>
+        <p:cNvPr id="1" name=""/>
+        <p:cNvGrpSpPr/>
+        <p:nvPr/>
+      </p:nvGrpSpPr>
+      <p:grpSpPr>
+        <a:xfrm>
+          <a:off x="0" y="0"/>
+          <a:ext cx="0" cy="0"/>
+          <a:chOff x="0" y="0"/>
+          <a:chExt cx="0" cy="0"/>
+        </a:xfrm>
+      </p:grpSpPr>
+      <p:sp>
+        <p:nvSpPr>
+          <p:cNvPr id="2" name="Titel 1"/>
+          <p:cNvSpPr>
+            <a:spLocks noGrp="1"/>
+          </p:cNvSpPr>
+          <p:nvPr>
+            <p:ph type="title"/>
+          </p:nvPr>
+        </p:nvSpPr>
+        <p:spPr/>
+        <p:txBody>
+          <a:bodyPr/>
+          <a:lstStyle/>
+          <a:p>
+            <a:r>
+              <a:rPr lang="da-DK" b="1"/>
+              <a:t>Code coverage</a:t>
+            </a:r>
+          </a:p>
+        </p:txBody>
+      </p:sp>
+      <p:sp>
+        <p:nvSpPr>
+          <p:cNvPr id="3" name="Pladsholder til indhold 2"/>
+          <p:cNvSpPr>
+            <a:spLocks noGrp="1"/>
+          </p:cNvSpPr>
+          <p:nvPr>
+            <p:ph idx="1"/>
+          </p:nvPr>
+        </p:nvSpPr>
+        <p:spPr>
+          <a:xfrm>
+            <a:off x="838200" y="1825625"/>
+            <a:ext cx="6855995" cy="4351338"/>
+          </a:xfrm>
+        </p:spPr>
+        <p:txBody>
+          <a:bodyPr/>
+          <a:lstStyle/>
+          <a:p>
+            <a:r>
+              <a:rPr lang="da-DK" dirty="0"/>
+              <a:t>Are all parts of the </a:t>
+            </a:r>
+            <a:r>
+              <a:rPr lang="da-DK" dirty="0" err="1"/>
+              <a:t>code</a:t>
+            </a:r>
+            <a:r>
+              <a:rPr lang="da-DK" dirty="0"/>
+              <a:t> ”</a:t>
+            </a:r>
+            <a:r>
+              <a:rPr lang="da-DK" dirty="0" err="1"/>
+              <a:t>touched</a:t>
+            </a:r>
+            <a:r>
+              <a:rPr lang="da-DK" dirty="0"/>
+              <a:t>” by the Unit Test?</a:t>
+            </a:r>
+          </a:p>
+          <a:p>
+            <a:r>
+              <a:rPr lang="da-DK" dirty="0"/>
+              <a:t>All lines of </a:t>
+            </a:r>
+            <a:r>
+              <a:rPr lang="da-DK" dirty="0" err="1"/>
+              <a:t>code</a:t>
+            </a:r>
+            <a:r>
+              <a:rPr lang="da-DK" dirty="0"/>
+              <a:t> </a:t>
+            </a:r>
+            <a:r>
+              <a:rPr lang="da-DK" dirty="0" err="1"/>
+              <a:t>should</a:t>
+            </a:r>
+            <a:r>
+              <a:rPr lang="da-DK" dirty="0"/>
+              <a:t> </a:t>
+            </a:r>
+            <a:r>
+              <a:rPr lang="da-DK" dirty="0" err="1"/>
+              <a:t>be</a:t>
+            </a:r>
+            <a:r>
+              <a:rPr lang="da-DK" dirty="0"/>
+              <a:t> </a:t>
+            </a:r>
+            <a:r>
+              <a:rPr lang="da-DK" dirty="0" err="1"/>
+              <a:t>covered</a:t>
+            </a:r>
+            <a:r>
+              <a:rPr lang="da-DK" dirty="0"/>
+              <a:t> by at </a:t>
+            </a:r>
+            <a:r>
+              <a:rPr lang="da-DK" dirty="0" err="1"/>
+              <a:t>least</a:t>
+            </a:r>
+            <a:r>
+              <a:rPr lang="da-DK" dirty="0"/>
+              <a:t> </a:t>
+            </a:r>
+            <a:r>
+              <a:rPr lang="da-DK" dirty="0" err="1"/>
+              <a:t>one</a:t>
+            </a:r>
+            <a:r>
+              <a:rPr lang="da-DK" dirty="0"/>
+              <a:t> Unit Test case</a:t>
+            </a:r>
+          </a:p>
+          <a:p>
+            <a:r>
+              <a:rPr lang="en-US" dirty="0"/>
+              <a:t>Start code coverage analysis by choosing </a:t>
+            </a:r>
+            <a:r>
+              <a:rPr lang="en-US" b="1" dirty="0"/>
+              <a:t>Test | Analyze Code Coverage for All Tests</a:t>
+            </a:r>
+            <a:endParaRPr lang="da-DK" dirty="0"/>
+          </a:p>
+        </p:txBody>
+      </p:sp>
+    </p:spTree>
+    <p:extLst>
+      <p:ext uri="{BB962C8B-B14F-4D97-AF65-F5344CB8AC3E}">
+        <p14:creationId xmlns:p14="http://schemas.microsoft.com/office/powerpoint/2010/main" val="3818030286"/>
+      </p:ext>
+    </p:extLst>
+  </p:cSld>
+  <p:clrMapOvr>
+    <a:masterClrMapping/>
+  </p:clrMapOvr>
 </p:sld>
 </file>
 
@@ -4016,100 +3930,46 @@
           <a:chExt cx="0" cy="0"/>
         </a:xfrm>
       </p:grpSpPr>
-      <p:sp>
-        <p:nvSpPr>
-          <p:cNvPr id="2" name="Titel 1"/>
-          <p:cNvSpPr>
-            <a:spLocks noGrp="1"/>
-          </p:cNvSpPr>
-          <p:nvPr>
-            <p:ph type="title"/>
-          </p:nvPr>
-        </p:nvSpPr>
-        <p:spPr/>
-        <p:txBody>
-          <a:bodyPr/>
-          <a:lstStyle/>
-          <a:p>
-            <a:r>
-              <a:rPr lang="da-DK" b="1" smtClean="0"/>
-              <a:t>Code coverage</a:t>
-            </a:r>
-            <a:endParaRPr lang="da-DK" b="1"/>
-          </a:p>
-        </p:txBody>
-      </p:sp>
-      <p:sp>
-        <p:nvSpPr>
-          <p:cNvPr id="3" name="Pladsholder til indhold 2"/>
-          <p:cNvSpPr>
-            <a:spLocks noGrp="1"/>
-          </p:cNvSpPr>
-          <p:nvPr>
-            <p:ph idx="1"/>
-          </p:nvPr>
-        </p:nvSpPr>
+      <p:pic>
+        <p:nvPicPr>
+          <p:cNvPr id="2" name="Billede 1">
+            <a:extLst>
+              <a:ext uri="{FF2B5EF4-FFF2-40B4-BE49-F238E27FC236}">
+                <a16:creationId xmlns:a16="http://schemas.microsoft.com/office/drawing/2014/main" id="{E1DB1420-74D5-4ED2-8943-A2BDDB9B3B45}"/>
+              </a:ext>
+            </a:extLst>
+          </p:cNvPr>
+          <p:cNvPicPr>
+            <a:picLocks noChangeAspect="1"/>
+          </p:cNvPicPr>
+          <p:nvPr/>
+        </p:nvPicPr>
+        <p:blipFill>
+          <a:blip r:embed="rId2"/>
+          <a:stretch>
+            <a:fillRect/>
+          </a:stretch>
+        </p:blipFill>
         <p:spPr>
           <a:xfrm>
-            <a:off x="838200" y="1825625"/>
-            <a:ext cx="6855995" cy="4351338"/>
+            <a:off x="292768" y="480664"/>
+            <a:ext cx="11606463" cy="5669340"/>
           </a:xfrm>
+          <a:prstGeom prst="rect">
+            <a:avLst/>
+          </a:prstGeom>
         </p:spPr>
-        <p:txBody>
-          <a:bodyPr/>
-          <a:lstStyle/>
-          <a:p>
-            <a:r>
-              <a:rPr lang="da-DK" smtClean="0"/>
-              <a:t>Are all parts of the code ”touched” by the Unit Test?</a:t>
-            </a:r>
-            <a:endParaRPr lang="da-DK" smtClean="0"/>
-          </a:p>
-          <a:p>
-            <a:r>
-              <a:rPr lang="da-DK" smtClean="0"/>
-              <a:t>All lines of code should be covered by at least one Unit Test case</a:t>
-            </a:r>
-            <a:endParaRPr lang="da-DK" smtClean="0"/>
-          </a:p>
-          <a:p>
-            <a:r>
-              <a:rPr lang="en-US" smtClean="0"/>
-              <a:t>Start code coverage analysis by choosing </a:t>
-            </a:r>
-            <a:r>
-              <a:rPr lang="en-US" b="1" smtClean="0"/>
-              <a:t>Test </a:t>
-            </a:r>
-            <a:r>
-              <a:rPr lang="en-US" b="1"/>
-              <a:t>| Analyze Code Coverage | All </a:t>
-            </a:r>
-            <a:r>
-              <a:rPr lang="en-US" b="1" smtClean="0"/>
-              <a:t>Tests</a:t>
-            </a:r>
-            <a:endParaRPr lang="da-DK"/>
-          </a:p>
-        </p:txBody>
-      </p:sp>
+      </p:pic>
     </p:spTree>
     <p:extLst>
       <p:ext uri="{BB962C8B-B14F-4D97-AF65-F5344CB8AC3E}">
-        <p14:creationId xmlns:p14="http://schemas.microsoft.com/office/powerpoint/2010/main" val="3818030286"/>
+        <p14:creationId xmlns:p14="http://schemas.microsoft.com/office/powerpoint/2010/main" val="569069820"/>
       </p:ext>
     </p:extLst>
   </p:cSld>
   <p:clrMapOvr>
     <a:masterClrMapping/>
   </p:clrMapOvr>
-  <p:timing>
-    <p:tnLst>
-      <p:par>
-        <p:cTn id="1" dur="indefinite" restart="never" nodeType="tmRoot"/>
-      </p:par>
-    </p:tnLst>
-  </p:timing>
 </p:sld>
 </file>
 
@@ -4132,8 +3992,16 @@
       </p:grpSpPr>
       <p:pic>
         <p:nvPicPr>
-          <p:cNvPr id="4" name="Billede 3"/>
-          <p:cNvPicPr/>
+          <p:cNvPr id="4" name="Billede 3">
+            <a:extLst>
+              <a:ext uri="{FF2B5EF4-FFF2-40B4-BE49-F238E27FC236}">
+                <a16:creationId xmlns:a16="http://schemas.microsoft.com/office/drawing/2014/main" id="{F6E97C9B-81AF-41CC-B851-9FC53BC2B2BC}"/>
+              </a:ext>
+            </a:extLst>
+          </p:cNvPr>
+          <p:cNvPicPr>
+            <a:picLocks noChangeAspect="1"/>
+          </p:cNvPicPr>
           <p:nvPr/>
         </p:nvPicPr>
         <p:blipFill>
@@ -4144,30 +4012,8 @@
         </p:blipFill>
         <p:spPr>
           <a:xfrm>
-            <a:off x="719221" y="334878"/>
-            <a:ext cx="10458116" cy="1782679"/>
-          </a:xfrm>
-          <a:prstGeom prst="rect">
-            <a:avLst/>
-          </a:prstGeom>
-        </p:spPr>
-      </p:pic>
-      <p:pic>
-        <p:nvPicPr>
-          <p:cNvPr id="5" name="Billede 4"/>
-          <p:cNvPicPr/>
-          <p:nvPr/>
-        </p:nvPicPr>
-        <p:blipFill>
-          <a:blip r:embed="rId3"/>
-          <a:stretch>
-            <a:fillRect/>
-          </a:stretch>
-        </p:blipFill>
-        <p:spPr>
-          <a:xfrm>
-            <a:off x="719221" y="2594977"/>
-            <a:ext cx="10512258" cy="3029785"/>
+            <a:off x="3176337" y="116959"/>
+            <a:ext cx="9245914" cy="6624082"/>
           </a:xfrm>
           <a:prstGeom prst="rect">
             <a:avLst/>
@@ -4177,28 +4023,13 @@
     </p:spTree>
     <p:extLst>
       <p:ext uri="{BB962C8B-B14F-4D97-AF65-F5344CB8AC3E}">
-        <p14:creationId xmlns:p14="http://schemas.microsoft.com/office/powerpoint/2010/main" val="569069820"/>
+        <p14:creationId xmlns:p14="http://schemas.microsoft.com/office/powerpoint/2010/main" val="3678307729"/>
       </p:ext>
     </p:extLst>
   </p:cSld>
   <p:clrMapOvr>
     <a:masterClrMapping/>
   </p:clrMapOvr>
-  <mc:AlternateContent xmlns:mc="http://schemas.openxmlformats.org/markup-compatibility/2006" xmlns:p14="http://schemas.microsoft.com/office/powerpoint/2010/main">
-    <mc:Choice Requires="p14">
-      <p:transition p14:dur="0"/>
-    </mc:Choice>
-    <mc:Fallback xmlns="">
-      <p:transition/>
-    </mc:Fallback>
-  </mc:AlternateContent>
-  <p:timing>
-    <p:tnLst>
-      <p:par>
-        <p:cTn id="1" dur="indefinite" restart="never" nodeType="tmRoot"/>
-      </p:par>
-    </p:tnLst>
-  </p:timing>
 </p:sld>
 </file>
 
@@ -4253,21 +4084,6 @@
   <p:clrMapOvr>
     <a:masterClrMapping/>
   </p:clrMapOvr>
-  <mc:AlternateContent xmlns:mc="http://schemas.openxmlformats.org/markup-compatibility/2006" xmlns:p14="http://schemas.microsoft.com/office/powerpoint/2010/main">
-    <mc:Choice Requires="p14">
-      <p:transition p14:dur="0"/>
-    </mc:Choice>
-    <mc:Fallback xmlns="">
-      <p:transition/>
-    </mc:Fallback>
-  </mc:AlternateContent>
-  <p:timing>
-    <p:tnLst>
-      <p:par>
-        <p:cTn id="1" dur="indefinite" restart="never" nodeType="tmRoot"/>
-      </p:par>
-    </p:tnLst>
-  </p:timing>
 </p:sld>
 </file>
 
@@ -4322,21 +4138,6 @@
   <p:clrMapOvr>
     <a:masterClrMapping/>
   </p:clrMapOvr>
-  <mc:AlternateContent xmlns:mc="http://schemas.openxmlformats.org/markup-compatibility/2006" xmlns:p14="http://schemas.microsoft.com/office/powerpoint/2010/main">
-    <mc:Choice Requires="p14">
-      <p:transition p14:dur="0"/>
-    </mc:Choice>
-    <mc:Fallback xmlns="">
-      <p:transition/>
-    </mc:Fallback>
-  </mc:AlternateContent>
-  <p:timing>
-    <p:tnLst>
-      <p:par>
-        <p:cTn id="1" dur="indefinite" restart="never" nodeType="tmRoot"/>
-      </p:par>
-    </p:tnLst>
-  </p:timing>
 </p:sld>
 </file>
 
@@ -4391,21 +4192,6 @@
   <p:clrMapOvr>
     <a:masterClrMapping/>
   </p:clrMapOvr>
-  <mc:AlternateContent xmlns:mc="http://schemas.openxmlformats.org/markup-compatibility/2006" xmlns:p14="http://schemas.microsoft.com/office/powerpoint/2010/main">
-    <mc:Choice Requires="p14">
-      <p:transition p14:dur="0"/>
-    </mc:Choice>
-    <mc:Fallback xmlns="">
-      <p:transition/>
-    </mc:Fallback>
-  </mc:AlternateContent>
-  <p:timing>
-    <p:tnLst>
-      <p:par>
-        <p:cTn id="1" dur="indefinite" restart="never" nodeType="tmRoot"/>
-      </p:par>
-    </p:tnLst>
-  </p:timing>
 </p:sld>
 </file>
 
@@ -4460,21 +4246,6 @@
   <p:clrMapOvr>
     <a:masterClrMapping/>
   </p:clrMapOvr>
-  <mc:AlternateContent xmlns:mc="http://schemas.openxmlformats.org/markup-compatibility/2006" xmlns:p14="http://schemas.microsoft.com/office/powerpoint/2010/main">
-    <mc:Choice Requires="p14">
-      <p:transition p14:dur="0"/>
-    </mc:Choice>
-    <mc:Fallback xmlns="">
-      <p:transition/>
-    </mc:Fallback>
-  </mc:AlternateContent>
-  <p:timing>
-    <p:tnLst>
-      <p:par>
-        <p:cTn id="1" dur="indefinite" restart="never" nodeType="tmRoot"/>
-      </p:par>
-    </p:tnLst>
-  </p:timing>
 </p:sld>
 </file>
 
@@ -4529,21 +4300,6 @@
   <p:clrMapOvr>
     <a:masterClrMapping/>
   </p:clrMapOvr>
-  <mc:AlternateContent xmlns:mc="http://schemas.openxmlformats.org/markup-compatibility/2006" xmlns:p14="http://schemas.microsoft.com/office/powerpoint/2010/main">
-    <mc:Choice Requires="p14">
-      <p:transition p14:dur="0"/>
-    </mc:Choice>
-    <mc:Fallback xmlns="">
-      <p:transition/>
-    </mc:Fallback>
-  </mc:AlternateContent>
-  <p:timing>
-    <p:tnLst>
-      <p:par>
-        <p:cTn id="1" dur="indefinite" restart="never" nodeType="tmRoot"/>
-      </p:par>
-    </p:tnLst>
-  </p:timing>
 </p:sld>
 </file>
 
@@ -4607,13 +4363,6 @@
   <p:clrMapOvr>
     <a:masterClrMapping/>
   </p:clrMapOvr>
-  <p:timing>
-    <p:tnLst>
-      <p:par>
-        <p:cTn id="1" dur="indefinite" restart="never" nodeType="tmRoot"/>
-      </p:par>
-    </p:tnLst>
-  </p:timing>
 </p:sld>
 </file>
 
@@ -4650,10 +4399,9 @@
           <a:lstStyle/>
           <a:p>
             <a:r>
-              <a:rPr lang="da-DK" b="1" smtClean="0"/>
+              <a:rPr lang="da-DK" b="1"/>
               <a:t>Unit Test Structure</a:t>
             </a:r>
-            <a:endParaRPr lang="da-DK" b="1"/>
           </a:p>
         </p:txBody>
       </p:sp>
@@ -4677,18 +4425,13 @@
               <a:buAutoNum type="arabicPeriod"/>
             </a:pPr>
             <a:r>
-              <a:rPr lang="da-DK" b="1" smtClean="0"/>
+              <a:rPr lang="da-DK" b="1"/>
               <a:t>ARRANGE</a:t>
             </a:r>
             <a:r>
-              <a:rPr lang="da-DK" smtClean="0"/>
-              <a:t>: </a:t>
-            </a:r>
-            <a:r>
-              <a:rPr lang="da-DK" smtClean="0"/>
-              <a:t>Create scenario for this specific test</a:t>
-            </a:r>
-            <a:endParaRPr lang="da-DK" smtClean="0"/>
+              <a:rPr lang="da-DK"/>
+              <a:t>: Create scenario for this specific test</a:t>
+            </a:r>
           </a:p>
           <a:p>
             <a:pPr marL="514350" indent="-514350">
@@ -4696,18 +4439,13 @@
               <a:buAutoNum type="arabicPeriod"/>
             </a:pPr>
             <a:r>
-              <a:rPr lang="da-DK" b="1" smtClean="0"/>
+              <a:rPr lang="da-DK" b="1"/>
               <a:t>ACT</a:t>
             </a:r>
             <a:r>
-              <a:rPr lang="da-DK" smtClean="0"/>
-              <a:t>: </a:t>
-            </a:r>
-            <a:r>
-              <a:rPr lang="da-DK" smtClean="0"/>
-              <a:t>Perform the test (e.g. a single method call)</a:t>
-            </a:r>
-            <a:endParaRPr lang="da-DK" smtClean="0"/>
+              <a:rPr lang="da-DK"/>
+              <a:t>: Perform the test (e.g. a single method call)</a:t>
+            </a:r>
           </a:p>
           <a:p>
             <a:pPr marL="514350" indent="-514350">
@@ -4715,22 +4453,13 @@
               <a:buAutoNum type="arabicPeriod"/>
             </a:pPr>
             <a:r>
-              <a:rPr lang="da-DK" b="1" smtClean="0"/>
+              <a:rPr lang="da-DK" b="1"/>
               <a:t>ASSERT</a:t>
             </a:r>
             <a:r>
-              <a:rPr lang="da-DK" smtClean="0"/>
-              <a:t>: </a:t>
-            </a:r>
-            <a:r>
-              <a:rPr lang="da-DK"/>
-              <a:t>C</a:t>
-            </a:r>
-            <a:r>
-              <a:rPr lang="da-DK" smtClean="0"/>
-              <a:t>ompare expected and actual result of the test</a:t>
-            </a:r>
-            <a:endParaRPr lang="da-DK" smtClean="0"/>
+              <a:rPr lang="da-DK"/>
+              <a:t>: Compare expected and actual result of the test</a:t>
+            </a:r>
           </a:p>
           <a:p>
             <a:pPr marL="514350" indent="-514350">
@@ -4744,7 +4473,7 @@
               <a:buNone/>
             </a:pPr>
             <a:r>
-              <a:rPr lang="da-DK" sz="7200" b="1" smtClean="0">
+              <a:rPr lang="da-DK" sz="7200" b="1">
                 <a:solidFill>
                   <a:schemeClr val="accent6">
                     <a:lumMod val="75000"/>
@@ -4753,31 +4482,19 @@
               </a:rPr>
               <a:t>SUCCESS</a:t>
             </a:r>
-            <a:endParaRPr lang="da-DK" sz="7200" b="1" smtClean="0">
-              <a:solidFill>
-                <a:schemeClr val="accent6">
-                  <a:lumMod val="75000"/>
-                </a:schemeClr>
-              </a:solidFill>
-            </a:endParaRPr>
           </a:p>
           <a:p>
             <a:pPr marL="0" indent="0" algn="ctr">
               <a:buNone/>
             </a:pPr>
             <a:r>
-              <a:rPr lang="da-DK" sz="7200" b="1" smtClean="0">
+              <a:rPr lang="da-DK" sz="7200" b="1">
                 <a:solidFill>
                   <a:srgbClr val="FF0000"/>
                 </a:solidFill>
               </a:rPr>
               <a:t>FAIL</a:t>
             </a:r>
-            <a:endParaRPr lang="da-DK" sz="7200" b="1" smtClean="0">
-              <a:solidFill>
-                <a:srgbClr val="FF0000"/>
-              </a:solidFill>
-            </a:endParaRPr>
           </a:p>
           <a:p>
             <a:pPr marL="0" indent="0">
@@ -4797,13 +4514,6 @@
   <p:clrMapOvr>
     <a:masterClrMapping/>
   </p:clrMapOvr>
-  <p:timing>
-    <p:tnLst>
-      <p:par>
-        <p:cTn id="1" dur="indefinite" restart="never" nodeType="tmRoot"/>
-      </p:par>
-    </p:tnLst>
-  </p:timing>
 </p:sld>
 </file>
 
@@ -4840,80 +4550,118 @@
           <a:lstStyle/>
           <a:p>
             <a:r>
-              <a:rPr lang="da-DK" b="1" smtClean="0"/>
-              <a:t>Unit Test </a:t>
-            </a:r>
-            <a:r>
-              <a:rPr lang="da-DK" b="1" smtClean="0"/>
+              <a:rPr lang="da-DK" b="1"/>
+              <a:t>Unit Test project</a:t>
+            </a:r>
+          </a:p>
+        </p:txBody>
+      </p:sp>
+      <p:sp>
+        <p:nvSpPr>
+          <p:cNvPr id="3" name="Pladsholder til indhold 2"/>
+          <p:cNvSpPr>
+            <a:spLocks noGrp="1"/>
+          </p:cNvSpPr>
+          <p:nvPr>
+            <p:ph idx="1"/>
+          </p:nvPr>
+        </p:nvSpPr>
+        <p:spPr/>
+        <p:txBody>
+          <a:bodyPr/>
+          <a:lstStyle/>
+          <a:p>
+            <a:r>
+              <a:rPr lang="da-DK" dirty="0" err="1"/>
+              <a:t>Add</a:t>
+            </a:r>
+            <a:r>
+              <a:rPr lang="da-DK" dirty="0"/>
+              <a:t> to same </a:t>
+            </a:r>
+            <a:r>
+              <a:rPr lang="da-DK" i="1" dirty="0"/>
+              <a:t>solution</a:t>
+            </a:r>
+            <a:r>
+              <a:rPr lang="da-DK" dirty="0"/>
+              <a:t> as </a:t>
+            </a:r>
+            <a:r>
+              <a:rPr lang="da-DK" dirty="0" err="1"/>
               <a:t>project</a:t>
             </a:r>
-            <a:endParaRPr lang="da-DK" b="1"/>
-          </a:p>
-        </p:txBody>
-      </p:sp>
-      <p:sp>
-        <p:nvSpPr>
-          <p:cNvPr id="3" name="Pladsholder til indhold 2"/>
-          <p:cNvSpPr>
-            <a:spLocks noGrp="1"/>
-          </p:cNvSpPr>
-          <p:nvPr>
-            <p:ph idx="1"/>
-          </p:nvPr>
-        </p:nvSpPr>
-        <p:spPr/>
-        <p:txBody>
-          <a:bodyPr/>
-          <a:lstStyle/>
-          <a:p>
-            <a:r>
-              <a:rPr lang="da-DK" smtClean="0"/>
-              <a:t>Add to same </a:t>
-            </a:r>
-            <a:r>
-              <a:rPr lang="da-DK" i="1" smtClean="0"/>
-              <a:t>solution</a:t>
-            </a:r>
-            <a:r>
-              <a:rPr lang="da-DK" smtClean="0"/>
+            <a:r>
+              <a:rPr lang="da-DK" dirty="0"/>
+              <a:t> under test</a:t>
+            </a:r>
+          </a:p>
+          <a:p>
+            <a:r>
+              <a:rPr lang="da-DK" dirty="0"/>
+              <a:t>Type of </a:t>
+            </a:r>
+            <a:r>
+              <a:rPr lang="da-DK" dirty="0" err="1"/>
+              <a:t>project</a:t>
+            </a:r>
+            <a:r>
+              <a:rPr lang="da-DK" dirty="0"/>
+              <a:t> is </a:t>
+            </a:r>
+            <a:r>
+              <a:rPr lang="da-DK" i="1" dirty="0" err="1"/>
+              <a:t>MSTest</a:t>
+            </a:r>
+            <a:r>
+              <a:rPr lang="da-DK" i="1" dirty="0"/>
+              <a:t> Test Project</a:t>
+            </a:r>
+          </a:p>
+          <a:p>
+            <a:r>
+              <a:rPr lang="da-DK" dirty="0" err="1"/>
+              <a:t>Name</a:t>
+            </a:r>
+            <a:r>
+              <a:rPr lang="da-DK" dirty="0"/>
+              <a:t>: up to </a:t>
+            </a:r>
+            <a:r>
+              <a:rPr lang="da-DK" dirty="0" err="1"/>
+              <a:t>you</a:t>
+            </a:r>
+            <a:r>
+              <a:rPr lang="da-DK" dirty="0"/>
               <a:t> </a:t>
             </a:r>
             <a:r>
-              <a:rPr lang="da-DK" smtClean="0"/>
-              <a:t>as project under test</a:t>
-            </a:r>
-            <a:endParaRPr lang="da-DK" smtClean="0"/>
-          </a:p>
-          <a:p>
-            <a:r>
-              <a:rPr lang="da-DK" smtClean="0"/>
-              <a:t>Type of project is </a:t>
-            </a:r>
-            <a:r>
-              <a:rPr lang="da-DK" i="1" smtClean="0"/>
-              <a:t>Unit Test Project</a:t>
-            </a:r>
-          </a:p>
-          <a:p>
-            <a:r>
-              <a:rPr lang="da-DK" smtClean="0"/>
-              <a:t>Name: up to you </a:t>
-            </a:r>
-            <a:r>
-              <a:rPr lang="da-DK" smtClean="0">
+              <a:rPr lang="da-DK" dirty="0">
                 <a:sym typeface="Wingdings" panose="05000000000000000000" pitchFamily="2" charset="2"/>
               </a:rPr>
-              <a:t>. E.g.</a:t>
-            </a:r>
-            <a:r>
-              <a:rPr lang="da-DK" smtClean="0"/>
+              <a:t>. </a:t>
+            </a:r>
+            <a:r>
+              <a:rPr lang="da-DK" dirty="0" err="1">
+                <a:sym typeface="Wingdings" panose="05000000000000000000" pitchFamily="2" charset="2"/>
+              </a:rPr>
+              <a:t>E.g</a:t>
+            </a:r>
+            <a:r>
+              <a:rPr lang="da-DK" dirty="0">
+                <a:sym typeface="Wingdings" panose="05000000000000000000" pitchFamily="2" charset="2"/>
+              </a:rPr>
+              <a:t>.</a:t>
+            </a:r>
+            <a:r>
+              <a:rPr lang="da-DK" dirty="0"/>
               <a:t> </a:t>
             </a:r>
             <a:r>
-              <a:rPr lang="da-DK" b="1" smtClean="0"/>
+              <a:rPr lang="da-DK" b="1" dirty="0" err="1"/>
               <a:t>UnitTestProject</a:t>
             </a:r>
-            <a:endParaRPr lang="da-DK" b="1"/>
+            <a:endParaRPr lang="da-DK" b="1" dirty="0"/>
           </a:p>
         </p:txBody>
       </p:sp>
@@ -4927,13 +4675,6 @@
   <p:clrMapOvr>
     <a:masterClrMapping/>
   </p:clrMapOvr>
-  <p:timing>
-    <p:tnLst>
-      <p:par>
-        <p:cTn id="1" dur="indefinite" restart="never" nodeType="tmRoot"/>
-      </p:par>
-    </p:tnLst>
-  </p:timing>
 </p:sld>
 </file>
 
@@ -4988,13 +4729,6 @@
   <p:clrMapOvr>
     <a:masterClrMapping/>
   </p:clrMapOvr>
-  <p:timing>
-    <p:tnLst>
-      <p:par>
-        <p:cTn id="1" dur="indefinite" restart="never" nodeType="tmRoot"/>
-      </p:par>
-    </p:tnLst>
-  </p:timing>
 </p:sld>
 </file>
 
@@ -5080,18 +4814,9 @@
           <a:p>
             <a:pPr algn="ctr"/>
             <a:r>
-              <a:rPr lang="da-DK" sz="2800" smtClean="0"/>
-              <a:t>”This class contains Unit </a:t>
-            </a:r>
-            <a:r>
-              <a:rPr lang="da-DK" sz="2800" smtClean="0"/>
-              <a:t>Test </a:t>
-            </a:r>
-            <a:r>
-              <a:rPr lang="da-DK" sz="2800" smtClean="0"/>
-              <a:t>methods”</a:t>
-            </a:r>
-            <a:endParaRPr lang="da-DK" sz="2800"/>
+              <a:rPr lang="da-DK" sz="2800"/>
+              <a:t>”This class contains Unit Test methods”</a:t>
+            </a:r>
           </a:p>
         </p:txBody>
       </p:sp>
@@ -5136,18 +4861,9 @@
           <a:p>
             <a:pPr algn="ctr"/>
             <a:r>
-              <a:rPr lang="da-DK" sz="2800" smtClean="0"/>
-              <a:t>”This method is a Unit </a:t>
-            </a:r>
-            <a:r>
-              <a:rPr lang="da-DK" sz="2800" smtClean="0"/>
-              <a:t>Test </a:t>
-            </a:r>
-            <a:r>
               <a:rPr lang="da-DK" sz="2800"/>
-              <a:t>method”</a:t>
-            </a:r>
-            <a:endParaRPr lang="da-DK" sz="2800"/>
+              <a:t>”This method is a Unit Test method”</a:t>
+            </a:r>
           </a:p>
         </p:txBody>
       </p:sp>
@@ -5161,13 +4877,6 @@
   <p:clrMapOvr>
     <a:masterClrMapping/>
   </p:clrMapOvr>
-  <p:timing>
-    <p:tnLst>
-      <p:par>
-        <p:cTn id="1" dur="indefinite" restart="never" nodeType="tmRoot"/>
-      </p:par>
-    </p:tnLst>
-  </p:timing>
 </p:sld>
 </file>
 
@@ -5222,21 +4931,6 @@
   <p:clrMapOvr>
     <a:masterClrMapping/>
   </p:clrMapOvr>
-  <mc:AlternateContent xmlns:mc="http://schemas.openxmlformats.org/markup-compatibility/2006" xmlns:p14="http://schemas.microsoft.com/office/powerpoint/2010/main">
-    <mc:Choice Requires="p14">
-      <p:transition p14:dur="0"/>
-    </mc:Choice>
-    <mc:Fallback xmlns="">
-      <p:transition/>
-    </mc:Fallback>
-  </mc:AlternateContent>
-  <p:timing>
-    <p:tnLst>
-      <p:par>
-        <p:cTn id="1" dur="indefinite" restart="never" nodeType="tmRoot"/>
-      </p:par>
-    </p:tnLst>
-  </p:timing>
 </p:sld>
 </file>
 
@@ -5291,21 +4985,6 @@
   <p:clrMapOvr>
     <a:masterClrMapping/>
   </p:clrMapOvr>
-  <mc:AlternateContent xmlns:mc="http://schemas.openxmlformats.org/markup-compatibility/2006" xmlns:p14="http://schemas.microsoft.com/office/powerpoint/2010/main">
-    <mc:Choice Requires="p14">
-      <p:transition p14:dur="0"/>
-    </mc:Choice>
-    <mc:Fallback xmlns="">
-      <p:transition/>
-    </mc:Fallback>
-  </mc:AlternateContent>
-  <p:timing>
-    <p:tnLst>
-      <p:par>
-        <p:cTn id="1" dur="indefinite" restart="never" nodeType="tmRoot"/>
-      </p:par>
-    </p:tnLst>
-  </p:timing>
 </p:sld>
 </file>
 

</xml_diff>